<commit_message>
UI Frontpanel new Picture
</commit_message>
<xml_diff>
--- a/Herzog Engineering - Design Patterns (Workers).pptx
+++ b/Herzog Engineering - Design Patterns (Workers).pptx
@@ -1351,6 +1351,62 @@
     </pc:docChg>
   </pc:docChgLst>
   <pc:docChgLst>
+    <pc:chgData name="Andreas Kreiseder" userId="4aaa136f-55d6-49b4-ba75-6f5df59da50e" providerId="ADAL" clId="{2DC7C2DF-E184-4255-9A05-A75DBEDB928E}"/>
+    <pc:docChg chg="undo custSel addSld modSld">
+      <pc:chgData name="Andreas Kreiseder" userId="4aaa136f-55d6-49b4-ba75-6f5df59da50e" providerId="ADAL" clId="{2DC7C2DF-E184-4255-9A05-A75DBEDB928E}" dt="2023-09-29T06:40:11.975" v="127" actId="403"/>
+      <pc:docMkLst>
+        <pc:docMk/>
+      </pc:docMkLst>
+      <pc:sldChg chg="addSp delSp modSp add mod">
+        <pc:chgData name="Andreas Kreiseder" userId="4aaa136f-55d6-49b4-ba75-6f5df59da50e" providerId="ADAL" clId="{2DC7C2DF-E184-4255-9A05-A75DBEDB928E}" dt="2023-09-29T06:40:11.975" v="127" actId="403"/>
+        <pc:sldMkLst>
+          <pc:docMk/>
+          <pc:sldMk cId="1499008099" sldId="304"/>
+        </pc:sldMkLst>
+        <pc:spChg chg="del">
+          <ac:chgData name="Andreas Kreiseder" userId="4aaa136f-55d6-49b4-ba75-6f5df59da50e" providerId="ADAL" clId="{2DC7C2DF-E184-4255-9A05-A75DBEDB928E}" dt="2023-09-29T06:36:36.247" v="2" actId="478"/>
+          <ac:spMkLst>
+            <pc:docMk/>
+            <pc:sldMk cId="1499008099" sldId="304"/>
+            <ac:spMk id="3" creationId="{E69C2CCC-EDC5-8E5A-704F-FC1AE7F889B9}"/>
+          </ac:spMkLst>
+        </pc:spChg>
+        <pc:spChg chg="add del mod">
+          <ac:chgData name="Andreas Kreiseder" userId="4aaa136f-55d6-49b4-ba75-6f5df59da50e" providerId="ADAL" clId="{2DC7C2DF-E184-4255-9A05-A75DBEDB928E}" dt="2023-09-29T06:37:29.387" v="11" actId="478"/>
+          <ac:spMkLst>
+            <pc:docMk/>
+            <pc:sldMk cId="1499008099" sldId="304"/>
+            <ac:spMk id="6" creationId="{0BD36430-2D2C-5660-D0FC-00E40BE512F4}"/>
+          </ac:spMkLst>
+        </pc:spChg>
+        <pc:spChg chg="add mod">
+          <ac:chgData name="Andreas Kreiseder" userId="4aaa136f-55d6-49b4-ba75-6f5df59da50e" providerId="ADAL" clId="{2DC7C2DF-E184-4255-9A05-A75DBEDB928E}" dt="2023-09-29T06:40:11.975" v="127" actId="403"/>
+          <ac:spMkLst>
+            <pc:docMk/>
+            <pc:sldMk cId="1499008099" sldId="304"/>
+            <ac:spMk id="8" creationId="{18EE6BFA-B90E-7110-3A4F-B47D7E8B6057}"/>
+          </ac:spMkLst>
+        </pc:spChg>
+        <pc:picChg chg="add mod">
+          <ac:chgData name="Andreas Kreiseder" userId="4aaa136f-55d6-49b4-ba75-6f5df59da50e" providerId="ADAL" clId="{2DC7C2DF-E184-4255-9A05-A75DBEDB928E}" dt="2023-09-29T06:37:50.911" v="23" actId="1076"/>
+          <ac:picMkLst>
+            <pc:docMk/>
+            <pc:sldMk cId="1499008099" sldId="304"/>
+            <ac:picMk id="7" creationId="{391DC147-775C-C5CA-02C5-35C96469D6F8}"/>
+          </ac:picMkLst>
+        </pc:picChg>
+        <pc:picChg chg="mod">
+          <ac:chgData name="Andreas Kreiseder" userId="4aaa136f-55d6-49b4-ba75-6f5df59da50e" providerId="ADAL" clId="{2DC7C2DF-E184-4255-9A05-A75DBEDB928E}" dt="2023-09-29T06:37:40.674" v="21" actId="1036"/>
+          <ac:picMkLst>
+            <pc:docMk/>
+            <pc:sldMk cId="1499008099" sldId="304"/>
+            <ac:picMk id="11" creationId="{0BE3DA45-0B2B-5ED2-E0FE-EED5C499408D}"/>
+          </ac:picMkLst>
+        </pc:picChg>
+      </pc:sldChg>
+    </pc:docChg>
+  </pc:docChgLst>
+  <pc:docChgLst>
     <pc:chgData name="Andreas Kreiseder" userId="4aaa136f-55d6-49b4-ba75-6f5df59da50e" providerId="ADAL" clId="{939FA1CA-047B-473F-97CA-47BDF2C5AD71}"/>
     <pc:docChg chg="undo custSel addSld delSld modSld sldOrd">
       <pc:chgData name="Andreas Kreiseder" userId="4aaa136f-55d6-49b4-ba75-6f5df59da50e" providerId="ADAL" clId="{939FA1CA-047B-473F-97CA-47BDF2C5AD71}" dt="2023-09-29T09:24:20.780" v="301" actId="1037"/>
@@ -1582,62 +1638,6 @@
             <pc:docMk/>
             <pc:sldMk cId="1624073500" sldId="306"/>
             <ac:picMk id="1026" creationId="{10D1E59A-7729-748E-EA4B-917B43255C0C}"/>
-          </ac:picMkLst>
-        </pc:picChg>
-      </pc:sldChg>
-    </pc:docChg>
-  </pc:docChgLst>
-  <pc:docChgLst>
-    <pc:chgData name="Andreas Kreiseder" userId="4aaa136f-55d6-49b4-ba75-6f5df59da50e" providerId="ADAL" clId="{2DC7C2DF-E184-4255-9A05-A75DBEDB928E}"/>
-    <pc:docChg chg="undo custSel addSld modSld">
-      <pc:chgData name="Andreas Kreiseder" userId="4aaa136f-55d6-49b4-ba75-6f5df59da50e" providerId="ADAL" clId="{2DC7C2DF-E184-4255-9A05-A75DBEDB928E}" dt="2023-09-29T06:40:11.975" v="127" actId="403"/>
-      <pc:docMkLst>
-        <pc:docMk/>
-      </pc:docMkLst>
-      <pc:sldChg chg="addSp delSp modSp add mod">
-        <pc:chgData name="Andreas Kreiseder" userId="4aaa136f-55d6-49b4-ba75-6f5df59da50e" providerId="ADAL" clId="{2DC7C2DF-E184-4255-9A05-A75DBEDB928E}" dt="2023-09-29T06:40:11.975" v="127" actId="403"/>
-        <pc:sldMkLst>
-          <pc:docMk/>
-          <pc:sldMk cId="1499008099" sldId="304"/>
-        </pc:sldMkLst>
-        <pc:spChg chg="del">
-          <ac:chgData name="Andreas Kreiseder" userId="4aaa136f-55d6-49b4-ba75-6f5df59da50e" providerId="ADAL" clId="{2DC7C2DF-E184-4255-9A05-A75DBEDB928E}" dt="2023-09-29T06:36:36.247" v="2" actId="478"/>
-          <ac:spMkLst>
-            <pc:docMk/>
-            <pc:sldMk cId="1499008099" sldId="304"/>
-            <ac:spMk id="3" creationId="{E69C2CCC-EDC5-8E5A-704F-FC1AE7F889B9}"/>
-          </ac:spMkLst>
-        </pc:spChg>
-        <pc:spChg chg="add del mod">
-          <ac:chgData name="Andreas Kreiseder" userId="4aaa136f-55d6-49b4-ba75-6f5df59da50e" providerId="ADAL" clId="{2DC7C2DF-E184-4255-9A05-A75DBEDB928E}" dt="2023-09-29T06:37:29.387" v="11" actId="478"/>
-          <ac:spMkLst>
-            <pc:docMk/>
-            <pc:sldMk cId="1499008099" sldId="304"/>
-            <ac:spMk id="6" creationId="{0BD36430-2D2C-5660-D0FC-00E40BE512F4}"/>
-          </ac:spMkLst>
-        </pc:spChg>
-        <pc:spChg chg="add mod">
-          <ac:chgData name="Andreas Kreiseder" userId="4aaa136f-55d6-49b4-ba75-6f5df59da50e" providerId="ADAL" clId="{2DC7C2DF-E184-4255-9A05-A75DBEDB928E}" dt="2023-09-29T06:40:11.975" v="127" actId="403"/>
-          <ac:spMkLst>
-            <pc:docMk/>
-            <pc:sldMk cId="1499008099" sldId="304"/>
-            <ac:spMk id="8" creationId="{18EE6BFA-B90E-7110-3A4F-B47D7E8B6057}"/>
-          </ac:spMkLst>
-        </pc:spChg>
-        <pc:picChg chg="add mod">
-          <ac:chgData name="Andreas Kreiseder" userId="4aaa136f-55d6-49b4-ba75-6f5df59da50e" providerId="ADAL" clId="{2DC7C2DF-E184-4255-9A05-A75DBEDB928E}" dt="2023-09-29T06:37:50.911" v="23" actId="1076"/>
-          <ac:picMkLst>
-            <pc:docMk/>
-            <pc:sldMk cId="1499008099" sldId="304"/>
-            <ac:picMk id="7" creationId="{391DC147-775C-C5CA-02C5-35C96469D6F8}"/>
-          </ac:picMkLst>
-        </pc:picChg>
-        <pc:picChg chg="mod">
-          <ac:chgData name="Andreas Kreiseder" userId="4aaa136f-55d6-49b4-ba75-6f5df59da50e" providerId="ADAL" clId="{2DC7C2DF-E184-4255-9A05-A75DBEDB928E}" dt="2023-09-29T06:37:40.674" v="21" actId="1036"/>
-          <ac:picMkLst>
-            <pc:docMk/>
-            <pc:sldMk cId="1499008099" sldId="304"/>
-            <ac:picMk id="11" creationId="{0BE3DA45-0B2B-5ED2-E0FE-EED5C499408D}"/>
           </ac:picMkLst>
         </pc:picChg>
       </pc:sldChg>
@@ -2153,7 +2153,7 @@
           <a:p>
             <a:fld id="{327C1D73-F4DF-4613-AB5C-2D89592E7FFB}" type="datetimeFigureOut">
               <a:rPr lang="de-CH" smtClean="0"/>
-              <a:t>03.06.2024</a:t>
+              <a:t>04.06.2024</a:t>
             </a:fld>
             <a:endParaRPr lang="de-CH"/>
           </a:p>
@@ -3175,7 +3175,7 @@
           <a:p>
             <a:fld id="{8B9E44C5-8F53-4385-A9FF-73C1ACC42DAD}" type="datetimeFigureOut">
               <a:rPr lang="en-AT" smtClean="0"/>
-              <a:t>06/03/2024</a:t>
+              <a:t>06/04/2024</a:t>
             </a:fld>
             <a:endParaRPr lang="en-AT"/>
           </a:p>
@@ -3375,7 +3375,7 @@
           <a:p>
             <a:fld id="{8B9E44C5-8F53-4385-A9FF-73C1ACC42DAD}" type="datetimeFigureOut">
               <a:rPr lang="en-AT" smtClean="0"/>
-              <a:t>06/03/2024</a:t>
+              <a:t>06/04/2024</a:t>
             </a:fld>
             <a:endParaRPr lang="en-AT"/>
           </a:p>
@@ -3585,7 +3585,7 @@
           <a:p>
             <a:fld id="{8B9E44C5-8F53-4385-A9FF-73C1ACC42DAD}" type="datetimeFigureOut">
               <a:rPr lang="en-AT" smtClean="0"/>
-              <a:t>06/03/2024</a:t>
+              <a:t>06/04/2024</a:t>
             </a:fld>
             <a:endParaRPr lang="en-AT"/>
           </a:p>
@@ -4215,7 +4215,7 @@
           <a:p>
             <a:fld id="{8B9E44C5-8F53-4385-A9FF-73C1ACC42DAD}" type="datetimeFigureOut">
               <a:rPr lang="en-AT" smtClean="0"/>
-              <a:t>06/03/2024</a:t>
+              <a:t>06/04/2024</a:t>
             </a:fld>
             <a:endParaRPr lang="en-AT"/>
           </a:p>
@@ -4491,7 +4491,7 @@
           <a:p>
             <a:fld id="{8B9E44C5-8F53-4385-A9FF-73C1ACC42DAD}" type="datetimeFigureOut">
               <a:rPr lang="en-AT" smtClean="0"/>
-              <a:t>06/03/2024</a:t>
+              <a:t>06/04/2024</a:t>
             </a:fld>
             <a:endParaRPr lang="en-AT"/>
           </a:p>
@@ -4759,7 +4759,7 @@
           <a:p>
             <a:fld id="{8B9E44C5-8F53-4385-A9FF-73C1ACC42DAD}" type="datetimeFigureOut">
               <a:rPr lang="en-AT" smtClean="0"/>
-              <a:t>06/03/2024</a:t>
+              <a:t>06/04/2024</a:t>
             </a:fld>
             <a:endParaRPr lang="en-AT"/>
           </a:p>
@@ -5174,7 +5174,7 @@
           <a:p>
             <a:fld id="{8B9E44C5-8F53-4385-A9FF-73C1ACC42DAD}" type="datetimeFigureOut">
               <a:rPr lang="en-AT" smtClean="0"/>
-              <a:t>06/03/2024</a:t>
+              <a:t>06/04/2024</a:t>
             </a:fld>
             <a:endParaRPr lang="en-AT"/>
           </a:p>
@@ -5316,7 +5316,7 @@
           <a:p>
             <a:fld id="{8B9E44C5-8F53-4385-A9FF-73C1ACC42DAD}" type="datetimeFigureOut">
               <a:rPr lang="en-AT" smtClean="0"/>
-              <a:t>06/03/2024</a:t>
+              <a:t>06/04/2024</a:t>
             </a:fld>
             <a:endParaRPr lang="en-AT"/>
           </a:p>
@@ -5429,7 +5429,7 @@
           <a:p>
             <a:fld id="{8B9E44C5-8F53-4385-A9FF-73C1ACC42DAD}" type="datetimeFigureOut">
               <a:rPr lang="en-AT" smtClean="0"/>
-              <a:t>06/03/2024</a:t>
+              <a:t>06/04/2024</a:t>
             </a:fld>
             <a:endParaRPr lang="en-AT"/>
           </a:p>
@@ -5742,7 +5742,7 @@
           <a:p>
             <a:fld id="{8B9E44C5-8F53-4385-A9FF-73C1ACC42DAD}" type="datetimeFigureOut">
               <a:rPr lang="en-AT" smtClean="0"/>
-              <a:t>06/03/2024</a:t>
+              <a:t>06/04/2024</a:t>
             </a:fld>
             <a:endParaRPr lang="en-AT"/>
           </a:p>
@@ -6031,7 +6031,7 @@
           <a:p>
             <a:fld id="{8B9E44C5-8F53-4385-A9FF-73C1ACC42DAD}" type="datetimeFigureOut">
               <a:rPr lang="en-AT" smtClean="0"/>
-              <a:t>06/03/2024</a:t>
+              <a:t>06/04/2024</a:t>
             </a:fld>
             <a:endParaRPr lang="en-AT"/>
           </a:p>
@@ -6274,7 +6274,7 @@
           <a:p>
             <a:fld id="{8B9E44C5-8F53-4385-A9FF-73C1ACC42DAD}" type="datetimeFigureOut">
               <a:rPr lang="en-AT" smtClean="0"/>
-              <a:t>06/03/2024</a:t>
+              <a:t>06/04/2024</a:t>
             </a:fld>
             <a:endParaRPr lang="en-AT"/>
           </a:p>
@@ -6755,19 +6755,7 @@
               <a:rPr lang="en-US" dirty="0">
                 <a:latin typeface="Arial Nova Light" panose="020B0304020202020204" pitchFamily="34" charset="0"/>
               </a:rPr>
-              <a:t>    Developer Summit </a:t>
-            </a:r>
-            <a:r>
-              <a:rPr lang="en-US" dirty="0" err="1">
-                <a:latin typeface="Arial Nova Light" panose="020B0304020202020204" pitchFamily="34" charset="0"/>
-              </a:rPr>
-              <a:t>Leoben</a:t>
-            </a:r>
-            <a:r>
-              <a:rPr lang="en-US" dirty="0">
-                <a:latin typeface="Arial Nova Light" panose="020B0304020202020204" pitchFamily="34" charset="0"/>
-              </a:rPr>
-              <a:t> 2024</a:t>
+              <a:t>    Developer Summit Leoben 2024</a:t>
             </a:r>
           </a:p>
         </p:txBody>
@@ -7006,7 +6994,7 @@
                 </a:solidFill>
                 <a:latin typeface="Arial Nova Light" panose="020B0304020202020204" pitchFamily="34" charset="0"/>
               </a:rPr>
-              <a:t> – Workers in LabVIEW ™</a:t>
+              <a:t> – Workers in LabVIEW™</a:t>
             </a:r>
             <a:endParaRPr kumimoji="0" lang="de-DE" sz="6600" b="1" i="0" u="none" strike="noStrike" kern="1200" cap="none" spc="0" normalizeH="0" baseline="0" noProof="0" dirty="0">
               <a:ln>
@@ -8874,19 +8862,7 @@
               <a:rPr lang="en-US" dirty="0">
                 <a:latin typeface="Arial Nova Light" panose="020B0304020202020204" pitchFamily="34" charset="0"/>
               </a:rPr>
-              <a:t>     Developer Summit </a:t>
-            </a:r>
-            <a:r>
-              <a:rPr lang="en-US" dirty="0" err="1">
-                <a:latin typeface="Arial Nova Light" panose="020B0304020202020204" pitchFamily="34" charset="0"/>
-              </a:rPr>
-              <a:t>Leoben</a:t>
-            </a:r>
-            <a:r>
-              <a:rPr lang="en-US" dirty="0">
-                <a:latin typeface="Arial Nova Light" panose="020B0304020202020204" pitchFamily="34" charset="0"/>
-              </a:rPr>
-              <a:t> 2024</a:t>
+              <a:t>     Developer Summit Leoben 2024</a:t>
             </a:r>
           </a:p>
         </p:txBody>
@@ -10970,19 +10946,7 @@
               <a:rPr lang="en-US" dirty="0">
                 <a:latin typeface="Arial Nova Light" panose="020B0304020202020204" pitchFamily="34" charset="0"/>
               </a:rPr>
-              <a:t>     Developer Summit </a:t>
-            </a:r>
-            <a:r>
-              <a:rPr lang="en-US" dirty="0" err="1">
-                <a:latin typeface="Arial Nova Light" panose="020B0304020202020204" pitchFamily="34" charset="0"/>
-              </a:rPr>
-              <a:t>Leoben</a:t>
-            </a:r>
-            <a:r>
-              <a:rPr lang="en-US" dirty="0">
-                <a:latin typeface="Arial Nova Light" panose="020B0304020202020204" pitchFamily="34" charset="0"/>
-              </a:rPr>
-              <a:t> 2024</a:t>
+              <a:t>     Developer Summit Leoben 2024</a:t>
             </a:r>
           </a:p>
         </p:txBody>
@@ -11705,19 +11669,7 @@
               <a:rPr lang="en-US" dirty="0">
                 <a:latin typeface="Arial Nova Light" panose="020B0304020202020204" pitchFamily="34" charset="0"/>
               </a:rPr>
-              <a:t>     Developer Summit </a:t>
-            </a:r>
-            <a:r>
-              <a:rPr lang="en-US" dirty="0" err="1">
-                <a:latin typeface="Arial Nova Light" panose="020B0304020202020204" pitchFamily="34" charset="0"/>
-              </a:rPr>
-              <a:t>Leoben</a:t>
-            </a:r>
-            <a:r>
-              <a:rPr lang="en-US" dirty="0">
-                <a:latin typeface="Arial Nova Light" panose="020B0304020202020204" pitchFamily="34" charset="0"/>
-              </a:rPr>
-              <a:t> 2024</a:t>
+              <a:t>     Developer Summit Leoben 2024</a:t>
             </a:r>
           </a:p>
         </p:txBody>
@@ -12687,19 +12639,7 @@
               <a:rPr lang="en-US" dirty="0">
                 <a:latin typeface="Arial Nova Light" panose="020B0304020202020204" pitchFamily="34" charset="0"/>
               </a:rPr>
-              <a:t>     Developer Summit </a:t>
-            </a:r>
-            <a:r>
-              <a:rPr lang="en-US" dirty="0" err="1">
-                <a:latin typeface="Arial Nova Light" panose="020B0304020202020204" pitchFamily="34" charset="0"/>
-              </a:rPr>
-              <a:t>Leoben</a:t>
-            </a:r>
-            <a:r>
-              <a:rPr lang="en-US" dirty="0">
-                <a:latin typeface="Arial Nova Light" panose="020B0304020202020204" pitchFamily="34" charset="0"/>
-              </a:rPr>
-              <a:t> 2024</a:t>
+              <a:t>     Developer Summit Leoben 2024</a:t>
             </a:r>
           </a:p>
         </p:txBody>
@@ -13394,19 +13334,7 @@
               <a:rPr lang="en-US" dirty="0">
                 <a:latin typeface="Arial Nova Light" panose="020B0304020202020204" pitchFamily="34" charset="0"/>
               </a:rPr>
-              <a:t>     Developer Summit </a:t>
-            </a:r>
-            <a:r>
-              <a:rPr lang="en-US" dirty="0" err="1">
-                <a:latin typeface="Arial Nova Light" panose="020B0304020202020204" pitchFamily="34" charset="0"/>
-              </a:rPr>
-              <a:t>Leoben</a:t>
-            </a:r>
-            <a:r>
-              <a:rPr lang="en-US" dirty="0">
-                <a:latin typeface="Arial Nova Light" panose="020B0304020202020204" pitchFamily="34" charset="0"/>
-              </a:rPr>
-              <a:t> 2024</a:t>
+              <a:t>     Developer Summit Leoben 2024</a:t>
             </a:r>
           </a:p>
         </p:txBody>
@@ -15090,19 +15018,7 @@
               <a:rPr lang="en-US" dirty="0">
                 <a:latin typeface="Arial Nova Light" panose="020B0304020202020204" pitchFamily="34" charset="0"/>
               </a:rPr>
-              <a:t>     Developer Summit </a:t>
-            </a:r>
-            <a:r>
-              <a:rPr lang="en-US" dirty="0" err="1">
-                <a:latin typeface="Arial Nova Light" panose="020B0304020202020204" pitchFamily="34" charset="0"/>
-              </a:rPr>
-              <a:t>Leoben</a:t>
-            </a:r>
-            <a:r>
-              <a:rPr lang="en-US" dirty="0">
-                <a:latin typeface="Arial Nova Light" panose="020B0304020202020204" pitchFamily="34" charset="0"/>
-              </a:rPr>
-              <a:t> 2024</a:t>
+              <a:t>     Developer Summit Leoben 2024</a:t>
             </a:r>
           </a:p>
         </p:txBody>
@@ -16304,19 +16220,7 @@
               <a:rPr lang="en-US" dirty="0">
                 <a:latin typeface="Arial Nova Light" panose="020B0304020202020204" pitchFamily="34" charset="0"/>
               </a:rPr>
-              <a:t>     Developer Summit </a:t>
-            </a:r>
-            <a:r>
-              <a:rPr lang="en-US" dirty="0" err="1">
-                <a:latin typeface="Arial Nova Light" panose="020B0304020202020204" pitchFamily="34" charset="0"/>
-              </a:rPr>
-              <a:t>Leoben</a:t>
-            </a:r>
-            <a:r>
-              <a:rPr lang="en-US" dirty="0">
-                <a:latin typeface="Arial Nova Light" panose="020B0304020202020204" pitchFamily="34" charset="0"/>
-              </a:rPr>
-              <a:t> 2024</a:t>
+              <a:t>     Developer Summit Leoben 2024</a:t>
             </a:r>
           </a:p>
         </p:txBody>
@@ -17069,19 +16973,7 @@
               <a:rPr lang="en-US" dirty="0">
                 <a:latin typeface="Arial Nova Light" panose="020B0304020202020204" pitchFamily="34" charset="0"/>
               </a:rPr>
-              <a:t>     Developer Summit </a:t>
-            </a:r>
-            <a:r>
-              <a:rPr lang="en-US" dirty="0" err="1">
-                <a:latin typeface="Arial Nova Light" panose="020B0304020202020204" pitchFamily="34" charset="0"/>
-              </a:rPr>
-              <a:t>Leoben</a:t>
-            </a:r>
-            <a:r>
-              <a:rPr lang="en-US" dirty="0">
-                <a:latin typeface="Arial Nova Light" panose="020B0304020202020204" pitchFamily="34" charset="0"/>
-              </a:rPr>
-              <a:t> 2024</a:t>
+              <a:t>     Developer Summit Leoben 2024</a:t>
             </a:r>
           </a:p>
         </p:txBody>
@@ -18067,19 +17959,7 @@
               <a:rPr lang="en-US" dirty="0">
                 <a:latin typeface="Arial Nova Light" panose="020B0304020202020204" pitchFamily="34" charset="0"/>
               </a:rPr>
-              <a:t>     Developer Summit </a:t>
-            </a:r>
-            <a:r>
-              <a:rPr lang="en-US" dirty="0" err="1">
-                <a:latin typeface="Arial Nova Light" panose="020B0304020202020204" pitchFamily="34" charset="0"/>
-              </a:rPr>
-              <a:t>Leoben</a:t>
-            </a:r>
-            <a:r>
-              <a:rPr lang="en-US" dirty="0">
-                <a:latin typeface="Arial Nova Light" panose="020B0304020202020204" pitchFamily="34" charset="0"/>
-              </a:rPr>
-              <a:t> 2024</a:t>
+              <a:t>     Developer Summit Leoben 2024</a:t>
             </a:r>
           </a:p>
         </p:txBody>
@@ -18732,19 +18612,7 @@
               <a:rPr lang="en-US" dirty="0">
                 <a:latin typeface="Arial Nova Light" panose="020B0304020202020204" pitchFamily="34" charset="0"/>
               </a:rPr>
-              <a:t>     Developer Summit </a:t>
-            </a:r>
-            <a:r>
-              <a:rPr lang="en-US" dirty="0" err="1">
-                <a:latin typeface="Arial Nova Light" panose="020B0304020202020204" pitchFamily="34" charset="0"/>
-              </a:rPr>
-              <a:t>Leoben</a:t>
-            </a:r>
-            <a:r>
-              <a:rPr lang="en-US" dirty="0">
-                <a:latin typeface="Arial Nova Light" panose="020B0304020202020204" pitchFamily="34" charset="0"/>
-              </a:rPr>
-              <a:t> 2024</a:t>
+              <a:t>     Developer Summit Leoben 2024</a:t>
             </a:r>
           </a:p>
         </p:txBody>
@@ -20118,19 +19986,7 @@
               <a:rPr lang="en-US" dirty="0">
                 <a:latin typeface="Arial Nova Light" panose="020B0304020202020204" pitchFamily="34" charset="0"/>
               </a:rPr>
-              <a:t>     Developer Summit </a:t>
-            </a:r>
-            <a:r>
-              <a:rPr lang="en-US" dirty="0" err="1">
-                <a:latin typeface="Arial Nova Light" panose="020B0304020202020204" pitchFamily="34" charset="0"/>
-              </a:rPr>
-              <a:t>Leoben</a:t>
-            </a:r>
-            <a:r>
-              <a:rPr lang="en-US" dirty="0">
-                <a:latin typeface="Arial Nova Light" panose="020B0304020202020204" pitchFamily="34" charset="0"/>
-              </a:rPr>
-              <a:t> 2024</a:t>
+              <a:t>     Developer Summit Leoben 2024</a:t>
             </a:r>
           </a:p>
         </p:txBody>
@@ -21150,19 +21006,7 @@
               <a:rPr lang="en-US" dirty="0">
                 <a:latin typeface="Arial Nova Light" panose="020B0304020202020204" pitchFamily="34" charset="0"/>
               </a:rPr>
-              <a:t>     Developer Summit </a:t>
-            </a:r>
-            <a:r>
-              <a:rPr lang="en-US" dirty="0" err="1">
-                <a:latin typeface="Arial Nova Light" panose="020B0304020202020204" pitchFamily="34" charset="0"/>
-              </a:rPr>
-              <a:t>Leoben</a:t>
-            </a:r>
-            <a:r>
-              <a:rPr lang="en-US" dirty="0">
-                <a:latin typeface="Arial Nova Light" panose="020B0304020202020204" pitchFamily="34" charset="0"/>
-              </a:rPr>
-              <a:t> 2024</a:t>
+              <a:t>     Developer Summit Leoben 2024</a:t>
             </a:r>
           </a:p>
         </p:txBody>
@@ -23274,19 +23118,7 @@
               <a:rPr lang="en-US" dirty="0">
                 <a:latin typeface="Arial Nova Light" panose="020B0304020202020204" pitchFamily="34" charset="0"/>
               </a:rPr>
-              <a:t>     Developer Summit </a:t>
-            </a:r>
-            <a:r>
-              <a:rPr lang="en-US" dirty="0" err="1">
-                <a:latin typeface="Arial Nova Light" panose="020B0304020202020204" pitchFamily="34" charset="0"/>
-              </a:rPr>
-              <a:t>Leoben</a:t>
-            </a:r>
-            <a:r>
-              <a:rPr lang="en-US" dirty="0">
-                <a:latin typeface="Arial Nova Light" panose="020B0304020202020204" pitchFamily="34" charset="0"/>
-              </a:rPr>
-              <a:t> 2024</a:t>
+              <a:t>     Developer Summit Leoben 2024</a:t>
             </a:r>
           </a:p>
         </p:txBody>

</xml_diff>